<commit_message>
Added README file, testing to see if it works and may push again shortly.
</commit_message>
<xml_diff>
--- a/Predicting Hotel Cancellation.pptx
+++ b/Predicting Hotel Cancellation.pptx
@@ -6718,7 +6718,7 @@
           <a:p>
             <a:fld id="{C34B739C-4378-446D-994C-FFEEDB21CC34}" type="datetimeFigureOut">
               <a:rPr lang="en-US" smtClean="0"/>
-              <a:t>1/27/2023</a:t>
+              <a:t>2/2/2023</a:t>
             </a:fld>
             <a:endParaRPr lang="en-US"/>
           </a:p>
@@ -8088,7 +8088,7 @@
           <a:p>
             <a:fld id="{2051A26B-8568-4B41-B670-38FE1FF2C4E1}" type="datetimeFigureOut">
               <a:rPr lang="en-US" smtClean="0"/>
-              <a:t>1/27/2023</a:t>
+              <a:t>2/2/2023</a:t>
             </a:fld>
             <a:endParaRPr lang="en-US"/>
           </a:p>
@@ -8339,7 +8339,7 @@
           <a:p>
             <a:fld id="{2051A26B-8568-4B41-B670-38FE1FF2C4E1}" type="datetimeFigureOut">
               <a:rPr lang="en-US" smtClean="0"/>
-              <a:t>1/27/2023</a:t>
+              <a:t>2/2/2023</a:t>
             </a:fld>
             <a:endParaRPr lang="en-US"/>
           </a:p>
@@ -8653,7 +8653,7 @@
           <a:p>
             <a:fld id="{2051A26B-8568-4B41-B670-38FE1FF2C4E1}" type="datetimeFigureOut">
               <a:rPr lang="en-US" smtClean="0"/>
-              <a:t>1/27/2023</a:t>
+              <a:t>2/2/2023</a:t>
             </a:fld>
             <a:endParaRPr lang="en-US"/>
           </a:p>
@@ -8994,7 +8994,7 @@
           <a:p>
             <a:fld id="{2051A26B-8568-4B41-B670-38FE1FF2C4E1}" type="datetimeFigureOut">
               <a:rPr lang="en-US" smtClean="0"/>
-              <a:t>1/27/2023</a:t>
+              <a:t>2/2/2023</a:t>
             </a:fld>
             <a:endParaRPr lang="en-US"/>
           </a:p>
@@ -9308,7 +9308,7 @@
           <a:p>
             <a:fld id="{2051A26B-8568-4B41-B670-38FE1FF2C4E1}" type="datetimeFigureOut">
               <a:rPr lang="en-US" smtClean="0"/>
-              <a:t>1/27/2023</a:t>
+              <a:t>2/2/2023</a:t>
             </a:fld>
             <a:endParaRPr lang="en-US"/>
           </a:p>
@@ -9701,7 +9701,7 @@
           <a:p>
             <a:fld id="{2051A26B-8568-4B41-B670-38FE1FF2C4E1}" type="datetimeFigureOut">
               <a:rPr lang="en-US" smtClean="0"/>
-              <a:t>1/27/2023</a:t>
+              <a:t>2/2/2023</a:t>
             </a:fld>
             <a:endParaRPr lang="en-US"/>
           </a:p>
@@ -9871,7 +9871,7 @@
           <a:p>
             <a:fld id="{2051A26B-8568-4B41-B670-38FE1FF2C4E1}" type="datetimeFigureOut">
               <a:rPr lang="en-US" smtClean="0"/>
-              <a:t>1/27/2023</a:t>
+              <a:t>2/2/2023</a:t>
             </a:fld>
             <a:endParaRPr lang="en-US"/>
           </a:p>
@@ -10051,7 +10051,7 @@
           <a:p>
             <a:fld id="{2051A26B-8568-4B41-B670-38FE1FF2C4E1}" type="datetimeFigureOut">
               <a:rPr lang="en-US" smtClean="0"/>
-              <a:t>1/27/2023</a:t>
+              <a:t>2/2/2023</a:t>
             </a:fld>
             <a:endParaRPr lang="en-US"/>
           </a:p>
@@ -10227,7 +10227,7 @@
           <a:p>
             <a:fld id="{2051A26B-8568-4B41-B670-38FE1FF2C4E1}" type="datetimeFigureOut">
               <a:rPr lang="en-US" smtClean="0"/>
-              <a:t>1/27/2023</a:t>
+              <a:t>2/2/2023</a:t>
             </a:fld>
             <a:endParaRPr lang="en-US"/>
           </a:p>
@@ -10474,7 +10474,7 @@
           <a:p>
             <a:fld id="{2051A26B-8568-4B41-B670-38FE1FF2C4E1}" type="datetimeFigureOut">
               <a:rPr lang="en-US" smtClean="0"/>
-              <a:t>1/27/2023</a:t>
+              <a:t>2/2/2023</a:t>
             </a:fld>
             <a:endParaRPr lang="en-US"/>
           </a:p>
@@ -10706,7 +10706,7 @@
           <a:p>
             <a:fld id="{2051A26B-8568-4B41-B670-38FE1FF2C4E1}" type="datetimeFigureOut">
               <a:rPr lang="en-US" smtClean="0"/>
-              <a:t>1/27/2023</a:t>
+              <a:t>2/2/2023</a:t>
             </a:fld>
             <a:endParaRPr lang="en-US"/>
           </a:p>
@@ -11080,7 +11080,7 @@
           <a:p>
             <a:fld id="{2051A26B-8568-4B41-B670-38FE1FF2C4E1}" type="datetimeFigureOut">
               <a:rPr lang="en-US" smtClean="0"/>
-              <a:t>1/27/2023</a:t>
+              <a:t>2/2/2023</a:t>
             </a:fld>
             <a:endParaRPr lang="en-US"/>
           </a:p>
@@ -11203,7 +11203,7 @@
           <a:p>
             <a:fld id="{2051A26B-8568-4B41-B670-38FE1FF2C4E1}" type="datetimeFigureOut">
               <a:rPr lang="en-US" smtClean="0"/>
-              <a:t>1/27/2023</a:t>
+              <a:t>2/2/2023</a:t>
             </a:fld>
             <a:endParaRPr lang="en-US"/>
           </a:p>
@@ -11298,7 +11298,7 @@
           <a:p>
             <a:fld id="{2051A26B-8568-4B41-B670-38FE1FF2C4E1}" type="datetimeFigureOut">
               <a:rPr lang="en-US" smtClean="0"/>
-              <a:t>1/27/2023</a:t>
+              <a:t>2/2/2023</a:t>
             </a:fld>
             <a:endParaRPr lang="en-US"/>
           </a:p>
@@ -11553,7 +11553,7 @@
           <a:p>
             <a:fld id="{2051A26B-8568-4B41-B670-38FE1FF2C4E1}" type="datetimeFigureOut">
               <a:rPr lang="en-US" smtClean="0"/>
-              <a:t>1/27/2023</a:t>
+              <a:t>2/2/2023</a:t>
             </a:fld>
             <a:endParaRPr lang="en-US"/>
           </a:p>
@@ -11816,7 +11816,7 @@
           <a:p>
             <a:fld id="{2051A26B-8568-4B41-B670-38FE1FF2C4E1}" type="datetimeFigureOut">
               <a:rPr lang="en-US" smtClean="0"/>
-              <a:t>1/27/2023</a:t>
+              <a:t>2/2/2023</a:t>
             </a:fld>
             <a:endParaRPr lang="en-US"/>
           </a:p>
@@ -12559,7 +12559,7 @@
           <a:p>
             <a:fld id="{2051A26B-8568-4B41-B670-38FE1FF2C4E1}" type="datetimeFigureOut">
               <a:rPr lang="en-US" smtClean="0"/>
-              <a:t>1/27/2023</a:t>
+              <a:t>2/2/2023</a:t>
             </a:fld>
             <a:endParaRPr lang="en-US"/>
           </a:p>
@@ -14090,6 +14090,15 @@
         <p:txBody>
           <a:bodyPr/>
           <a:lstStyle/>
+          <a:p>
+            <a:r>
+              <a:rPr lang="en-US" dirty="0">
+                <a:hlinkClick r:id="rId2"/>
+              </a:rPr>
+              <a:t>https://www.bu.edu/bhr/2021/06/29/consumers-vs-revenue-managers-the-case-of-cancelations-and-no-shows/</a:t>
+            </a:r>
+            <a:endParaRPr lang="en-US" dirty="0"/>
+          </a:p>
           <a:p>
             <a:endParaRPr lang="en-US" dirty="0"/>
           </a:p>

</xml_diff>